<commit_message>
update: text size of PPT auto-modified
</commit_message>
<xml_diff>
--- a/PaperExport/exe/dist/13、2019杨浦二模.pptx
+++ b/PaperExport/exe/dist/13、2019杨浦二模.pptx
@@ -457,31 +457,63 @@
           <a:lstStyle/>
           <a:p/>
           <a:p>
-            <a:pPr>
-              <a:defRPr sz="1600">
-                <a:solidFill>
-                  <a:srgbClr val="FFFFFF"/>
-                </a:solidFill>
-                <a:latin typeface="Times New Roman"/>
-              </a:defRPr>
-            </a:pPr>
-            <a:r>
-              <a:t>Susan is frightened ____ heights but also enjoys pushing against her own fear as a challenge.</a:t>
-            </a:r>
-            <a:br/>
-            <a:r>
+            <a:r>
+              <a:rPr sz="2400">
+                <a:solidFill>
+                  <a:srgbClr val="FFFFFF"/>
+                </a:solidFill>
+                <a:latin typeface="Times New Roman"/>
+              </a:rPr>
+              <a:t>Susan is frightened ____ heights but also enjoys pushing</a:t>
+            </a:r>
+            <a:br/>
+            <a:r>
+              <a:rPr sz="2400">
+                <a:solidFill>
+                  <a:srgbClr val="FFFFFF"/>
+                </a:solidFill>
+                <a:latin typeface="Times New Roman"/>
+              </a:rPr>
+              <a:t>against her own fear as a challenge.</a:t>
+            </a:r>
+            <a:br/>
+            <a:r>
+              <a:rPr sz="2400">
+                <a:solidFill>
+                  <a:srgbClr val="FFFFFF"/>
+                </a:solidFill>
+                <a:latin typeface="Times New Roman"/>
+              </a:rPr>
               <a:t>A．for</a:t>
             </a:r>
             <a:br/>
             <a:r>
+              <a:rPr sz="2400">
+                <a:solidFill>
+                  <a:srgbClr val="FFFFFF"/>
+                </a:solidFill>
+                <a:latin typeface="Times New Roman"/>
+              </a:rPr>
               <a:t>B．with</a:t>
             </a:r>
             <a:br/>
             <a:r>
+              <a:rPr sz="2400">
+                <a:solidFill>
+                  <a:srgbClr val="FFFFFF"/>
+                </a:solidFill>
+                <a:latin typeface="Times New Roman"/>
+              </a:rPr>
               <a:t>C．of</a:t>
             </a:r>
             <a:br/>
             <a:r>
+              <a:rPr sz="2400">
+                <a:solidFill>
+                  <a:srgbClr val="FFFFFF"/>
+                </a:solidFill>
+                <a:latin typeface="Times New Roman"/>
+              </a:rPr>
               <a:t>D．about</a:t>
             </a:r>
           </a:p>
@@ -662,31 +694,53 @@
           <a:lstStyle/>
           <a:p/>
           <a:p>
-            <a:pPr>
-              <a:defRPr sz="1600">
-                <a:solidFill>
-                  <a:srgbClr val="FFFFFF"/>
-                </a:solidFill>
-                <a:latin typeface="Times New Roman"/>
-              </a:defRPr>
-            </a:pPr>
-            <a:r>
+            <a:r>
+              <a:rPr sz="2400">
+                <a:solidFill>
+                  <a:srgbClr val="FFFFFF"/>
+                </a:solidFill>
+                <a:latin typeface="Times New Roman"/>
+              </a:rPr>
               <a:t>We tried a lot of hotels, but ___ of them had a room.</a:t>
             </a:r>
             <a:br/>
             <a:r>
+              <a:rPr sz="2400">
+                <a:solidFill>
+                  <a:srgbClr val="FFFFFF"/>
+                </a:solidFill>
+                <a:latin typeface="Times New Roman"/>
+              </a:rPr>
               <a:t>A．both</a:t>
             </a:r>
             <a:br/>
             <a:r>
+              <a:rPr sz="2400">
+                <a:solidFill>
+                  <a:srgbClr val="FFFFFF"/>
+                </a:solidFill>
+                <a:latin typeface="Times New Roman"/>
+              </a:rPr>
               <a:t>B．neither</a:t>
             </a:r>
             <a:br/>
             <a:r>
+              <a:rPr sz="2400">
+                <a:solidFill>
+                  <a:srgbClr val="FFFFFF"/>
+                </a:solidFill>
+                <a:latin typeface="Times New Roman"/>
+              </a:rPr>
               <a:t>C．all</a:t>
             </a:r>
             <a:br/>
             <a:r>
+              <a:rPr sz="2400">
+                <a:solidFill>
+                  <a:srgbClr val="FFFFFF"/>
+                </a:solidFill>
+                <a:latin typeface="Times New Roman"/>
+              </a:rPr>
               <a:t>D．none</a:t>
             </a:r>
           </a:p>
@@ -867,31 +921,63 @@
           <a:lstStyle/>
           <a:p/>
           <a:p>
-            <a:pPr>
-              <a:defRPr sz="1600">
-                <a:solidFill>
-                  <a:srgbClr val="FFFFFF"/>
-                </a:solidFill>
-                <a:latin typeface="Times New Roman"/>
-              </a:defRPr>
-            </a:pPr>
-            <a:r>
-              <a:t>Awesome place to stay! Rooms were clean, and everyone looked ________ here.</a:t>
-            </a:r>
-            <a:br/>
-            <a:r>
+            <a:r>
+              <a:rPr sz="2400">
+                <a:solidFill>
+                  <a:srgbClr val="FFFFFF"/>
+                </a:solidFill>
+                <a:latin typeface="Times New Roman"/>
+              </a:rPr>
+              <a:t>Awesome place to stay! Rooms were clean, and everyone looked</a:t>
+            </a:r>
+            <a:br/>
+            <a:r>
+              <a:rPr sz="2400">
+                <a:solidFill>
+                  <a:srgbClr val="FFFFFF"/>
+                </a:solidFill>
+                <a:latin typeface="Times New Roman"/>
+              </a:rPr>
+              <a:t>________ here.</a:t>
+            </a:r>
+            <a:br/>
+            <a:r>
+              <a:rPr sz="2400">
+                <a:solidFill>
+                  <a:srgbClr val="FFFFFF"/>
+                </a:solidFill>
+                <a:latin typeface="Times New Roman"/>
+              </a:rPr>
               <a:t>A．friendly</a:t>
             </a:r>
             <a:br/>
             <a:r>
+              <a:rPr sz="2400">
+                <a:solidFill>
+                  <a:srgbClr val="FFFFFF"/>
+                </a:solidFill>
+                <a:latin typeface="Times New Roman"/>
+              </a:rPr>
               <a:t>B．happily</a:t>
             </a:r>
             <a:br/>
             <a:r>
+              <a:rPr sz="2400">
+                <a:solidFill>
+                  <a:srgbClr val="FFFFFF"/>
+                </a:solidFill>
+                <a:latin typeface="Times New Roman"/>
+              </a:rPr>
               <a:t>C．angrily</a:t>
             </a:r>
             <a:br/>
             <a:r>
+              <a:rPr sz="2400">
+                <a:solidFill>
+                  <a:srgbClr val="FFFFFF"/>
+                </a:solidFill>
+                <a:latin typeface="Times New Roman"/>
+              </a:rPr>
               <a:t>D．sadly</a:t>
             </a:r>
           </a:p>
@@ -1072,31 +1158,53 @@
           <a:lstStyle/>
           <a:p/>
           <a:p>
-            <a:pPr>
-              <a:defRPr sz="1600">
-                <a:solidFill>
-                  <a:srgbClr val="FFFFFF"/>
-                </a:solidFill>
-                <a:latin typeface="Times New Roman"/>
-              </a:defRPr>
-            </a:pPr>
-            <a:r>
+            <a:r>
+              <a:rPr sz="2400">
+                <a:solidFill>
+                  <a:srgbClr val="FFFFFF"/>
+                </a:solidFill>
+                <a:latin typeface="Times New Roman"/>
+              </a:rPr>
               <a:t>My son didn’t spend ____ money as his friends did on games.</a:t>
             </a:r>
             <a:br/>
             <a:r>
+              <a:rPr sz="2400">
+                <a:solidFill>
+                  <a:srgbClr val="FFFFFF"/>
+                </a:solidFill>
+                <a:latin typeface="Times New Roman"/>
+              </a:rPr>
               <a:t>A．much</a:t>
             </a:r>
             <a:br/>
             <a:r>
+              <a:rPr sz="2400">
+                <a:solidFill>
+                  <a:srgbClr val="FFFFFF"/>
+                </a:solidFill>
+                <a:latin typeface="Times New Roman"/>
+              </a:rPr>
               <a:t>B．as much</a:t>
             </a:r>
             <a:br/>
             <a:r>
+              <a:rPr sz="2400">
+                <a:solidFill>
+                  <a:srgbClr val="FFFFFF"/>
+                </a:solidFill>
+                <a:latin typeface="Times New Roman"/>
+              </a:rPr>
               <a:t>C．more</a:t>
             </a:r>
             <a:br/>
             <a:r>
+              <a:rPr sz="2400">
+                <a:solidFill>
+                  <a:srgbClr val="FFFFFF"/>
+                </a:solidFill>
+                <a:latin typeface="Times New Roman"/>
+              </a:rPr>
               <a:t>D．most</a:t>
             </a:r>
           </a:p>
@@ -1277,31 +1385,53 @@
           <a:lstStyle/>
           <a:p/>
           <a:p>
-            <a:pPr>
-              <a:defRPr sz="1600">
-                <a:solidFill>
-                  <a:srgbClr val="FFFFFF"/>
-                </a:solidFill>
-                <a:latin typeface="Times New Roman"/>
-              </a:defRPr>
-            </a:pPr>
-            <a:r>
+            <a:r>
+              <a:rPr sz="2400">
+                <a:solidFill>
+                  <a:srgbClr val="FFFFFF"/>
+                </a:solidFill>
+                <a:latin typeface="Times New Roman"/>
+              </a:rPr>
               <a:t>I’m going out for a walk．I need some fresh ____.</a:t>
             </a:r>
             <a:br/>
             <a:r>
+              <a:rPr sz="2400">
+                <a:solidFill>
+                  <a:srgbClr val="FFFFFF"/>
+                </a:solidFill>
+                <a:latin typeface="Times New Roman"/>
+              </a:rPr>
               <a:t>A．air</a:t>
             </a:r>
             <a:br/>
             <a:r>
+              <a:rPr sz="2400">
+                <a:solidFill>
+                  <a:srgbClr val="FFFFFF"/>
+                </a:solidFill>
+                <a:latin typeface="Times New Roman"/>
+              </a:rPr>
               <a:t>B．idea</a:t>
             </a:r>
             <a:br/>
             <a:r>
+              <a:rPr sz="2400">
+                <a:solidFill>
+                  <a:srgbClr val="FFFFFF"/>
+                </a:solidFill>
+                <a:latin typeface="Times New Roman"/>
+              </a:rPr>
               <a:t>C．vegetable</a:t>
             </a:r>
             <a:br/>
             <a:r>
+              <a:rPr sz="2400">
+                <a:solidFill>
+                  <a:srgbClr val="FFFFFF"/>
+                </a:solidFill>
+                <a:latin typeface="Times New Roman"/>
+              </a:rPr>
               <a:t>D．flower</a:t>
             </a:r>
           </a:p>
@@ -1482,35 +1612,63 @@
           <a:lstStyle/>
           <a:p/>
           <a:p>
-            <a:pPr>
-              <a:defRPr sz="1600">
-                <a:solidFill>
-                  <a:srgbClr val="FFFFFF"/>
-                </a:solidFill>
-                <a:latin typeface="Times New Roman"/>
-              </a:defRPr>
-            </a:pPr>
-            <a:r>
+            <a:r>
+              <a:rPr sz="2400">
+                <a:solidFill>
+                  <a:srgbClr val="FFFFFF"/>
+                </a:solidFill>
+                <a:latin typeface="Times New Roman"/>
+              </a:rPr>
               <a:t>–___.</a:t>
             </a:r>
             <a:br/>
             <a:r>
+              <a:rPr sz="2400">
+                <a:solidFill>
+                  <a:srgbClr val="FFFFFF"/>
+                </a:solidFill>
+                <a:latin typeface="Times New Roman"/>
+              </a:rPr>
               <a:t>–You’re welcome.</a:t>
             </a:r>
             <a:br/>
             <a:r>
+              <a:rPr sz="2400">
+                <a:solidFill>
+                  <a:srgbClr val="FFFFFF"/>
+                </a:solidFill>
+                <a:latin typeface="Times New Roman"/>
+              </a:rPr>
               <a:t>A．I’m sorry about the mess.</a:t>
             </a:r>
             <a:br/>
             <a:r>
+              <a:rPr sz="2400">
+                <a:solidFill>
+                  <a:srgbClr val="FFFFFF"/>
+                </a:solidFill>
+                <a:latin typeface="Times New Roman"/>
+              </a:rPr>
               <a:t>B．Thanks very much for your help.</a:t>
             </a:r>
             <a:br/>
             <a:r>
+              <a:rPr sz="2400">
+                <a:solidFill>
+                  <a:srgbClr val="FFFFFF"/>
+                </a:solidFill>
+                <a:latin typeface="Times New Roman"/>
+              </a:rPr>
               <a:t>C．Wish you a safe journey.</a:t>
             </a:r>
             <a:br/>
             <a:r>
+              <a:rPr sz="2400">
+                <a:solidFill>
+                  <a:srgbClr val="FFFFFF"/>
+                </a:solidFill>
+                <a:latin typeface="Times New Roman"/>
+              </a:rPr>
               <a:t>D．Let me help you with the bag.</a:t>
             </a:r>
           </a:p>
@@ -1574,35 +1732,63 @@
           <a:lstStyle/>
           <a:p/>
           <a:p>
-            <a:pPr>
-              <a:defRPr sz="1600">
-                <a:solidFill>
-                  <a:srgbClr val="FFFFFF"/>
-                </a:solidFill>
-                <a:latin typeface="Times New Roman"/>
-              </a:defRPr>
-            </a:pPr>
-            <a:r>
+            <a:r>
+              <a:rPr sz="2400">
+                <a:solidFill>
+                  <a:srgbClr val="FFFFFF"/>
+                </a:solidFill>
+                <a:latin typeface="Times New Roman"/>
+              </a:rPr>
               <a:t>–________ is the Bund from our hotel?</a:t>
             </a:r>
             <a:br/>
             <a:r>
+              <a:rPr sz="2400">
+                <a:solidFill>
+                  <a:srgbClr val="FFFFFF"/>
+                </a:solidFill>
+                <a:latin typeface="Times New Roman"/>
+              </a:rPr>
               <a:t>–About twenty minutes’ walk.</a:t>
             </a:r>
             <a:br/>
             <a:r>
+              <a:rPr sz="2400">
+                <a:solidFill>
+                  <a:srgbClr val="FFFFFF"/>
+                </a:solidFill>
+                <a:latin typeface="Times New Roman"/>
+              </a:rPr>
               <a:t>A. How</a:t>
             </a:r>
             <a:br/>
             <a:r>
+              <a:rPr sz="2400">
+                <a:solidFill>
+                  <a:srgbClr val="FFFFFF"/>
+                </a:solidFill>
+                <a:latin typeface="Times New Roman"/>
+              </a:rPr>
               <a:t>B. How far</a:t>
             </a:r>
             <a:br/>
             <a:r>
+              <a:rPr sz="2400">
+                <a:solidFill>
+                  <a:srgbClr val="FFFFFF"/>
+                </a:solidFill>
+                <a:latin typeface="Times New Roman"/>
+              </a:rPr>
               <a:t>C. How long</a:t>
             </a:r>
             <a:br/>
             <a:r>
+              <a:rPr sz="2400">
+                <a:solidFill>
+                  <a:srgbClr val="FFFFFF"/>
+                </a:solidFill>
+                <a:latin typeface="Times New Roman"/>
+              </a:rPr>
               <a:t>D. How soon</a:t>
             </a:r>
           </a:p>
@@ -1783,31 +1969,63 @@
           <a:lstStyle/>
           <a:p/>
           <a:p>
-            <a:pPr>
-              <a:defRPr sz="1600">
-                <a:solidFill>
-                  <a:srgbClr val="FFFFFF"/>
-                </a:solidFill>
-                <a:latin typeface="Times New Roman"/>
-              </a:defRPr>
-            </a:pPr>
-            <a:r>
-              <a:t>When they got home last night, they found that somebody ___ into the flat.</a:t>
-            </a:r>
-            <a:br/>
-            <a:r>
+            <a:r>
+              <a:rPr sz="2400">
+                <a:solidFill>
+                  <a:srgbClr val="FFFFFF"/>
+                </a:solidFill>
+                <a:latin typeface="Times New Roman"/>
+              </a:rPr>
+              <a:t>When they got home last night, they found that somebody ___</a:t>
+            </a:r>
+            <a:br/>
+            <a:r>
+              <a:rPr sz="2400">
+                <a:solidFill>
+                  <a:srgbClr val="FFFFFF"/>
+                </a:solidFill>
+                <a:latin typeface="Times New Roman"/>
+              </a:rPr>
+              <a:t>into the flat.</a:t>
+            </a:r>
+            <a:br/>
+            <a:r>
+              <a:rPr sz="2400">
+                <a:solidFill>
+                  <a:srgbClr val="FFFFFF"/>
+                </a:solidFill>
+                <a:latin typeface="Times New Roman"/>
+              </a:rPr>
               <a:t>A．breaks</a:t>
             </a:r>
             <a:br/>
             <a:r>
+              <a:rPr sz="2400">
+                <a:solidFill>
+                  <a:srgbClr val="FFFFFF"/>
+                </a:solidFill>
+                <a:latin typeface="Times New Roman"/>
+              </a:rPr>
               <a:t>B．is breaking</a:t>
             </a:r>
             <a:br/>
             <a:r>
+              <a:rPr sz="2400">
+                <a:solidFill>
+                  <a:srgbClr val="FFFFFF"/>
+                </a:solidFill>
+                <a:latin typeface="Times New Roman"/>
+              </a:rPr>
               <a:t>C．has broken</a:t>
             </a:r>
             <a:br/>
             <a:r>
+              <a:rPr sz="2400">
+                <a:solidFill>
+                  <a:srgbClr val="FFFFFF"/>
+                </a:solidFill>
+                <a:latin typeface="Times New Roman"/>
+              </a:rPr>
               <a:t>D．had broken</a:t>
             </a:r>
           </a:p>
@@ -1988,31 +2206,53 @@
           <a:lstStyle/>
           <a:p/>
           <a:p>
-            <a:pPr>
-              <a:defRPr sz="1600">
-                <a:solidFill>
-                  <a:srgbClr val="FFFFFF"/>
-                </a:solidFill>
-                <a:latin typeface="Times New Roman"/>
-              </a:defRPr>
-            </a:pPr>
-            <a:r>
+            <a:r>
+              <a:rPr sz="2400">
+                <a:solidFill>
+                  <a:srgbClr val="FFFFFF"/>
+                </a:solidFill>
+                <a:latin typeface="Times New Roman"/>
+              </a:rPr>
               <a:t>I haven’t decided where to go on holiday．I ___ go to Canada.</a:t>
             </a:r>
             <a:br/>
             <a:r>
+              <a:rPr sz="2400">
+                <a:solidFill>
+                  <a:srgbClr val="FFFFFF"/>
+                </a:solidFill>
+                <a:latin typeface="Times New Roman"/>
+              </a:rPr>
               <a:t>A．may</a:t>
             </a:r>
             <a:br/>
             <a:r>
+              <a:rPr sz="2400">
+                <a:solidFill>
+                  <a:srgbClr val="FFFFFF"/>
+                </a:solidFill>
+                <a:latin typeface="Times New Roman"/>
+              </a:rPr>
               <a:t>B．need</a:t>
             </a:r>
             <a:br/>
             <a:r>
+              <a:rPr sz="2400">
+                <a:solidFill>
+                  <a:srgbClr val="FFFFFF"/>
+                </a:solidFill>
+                <a:latin typeface="Times New Roman"/>
+              </a:rPr>
               <a:t>C．must</a:t>
             </a:r>
             <a:br/>
             <a:r>
+              <a:rPr sz="2400">
+                <a:solidFill>
+                  <a:srgbClr val="FFFFFF"/>
+                </a:solidFill>
+                <a:latin typeface="Times New Roman"/>
+              </a:rPr>
               <a:t>D．can</a:t>
             </a:r>
           </a:p>
@@ -2193,31 +2433,63 @@
           <a:lstStyle/>
           <a:p/>
           <a:p>
-            <a:pPr>
-              <a:defRPr sz="1600">
-                <a:solidFill>
-                  <a:srgbClr val="FFFFFF"/>
-                </a:solidFill>
-                <a:latin typeface="Times New Roman"/>
-              </a:defRPr>
-            </a:pPr>
-            <a:r>
-              <a:t>My mum always avoids ___ home from work at 5 p.m．as there’s so much traffic then.</a:t>
-            </a:r>
-            <a:br/>
-            <a:r>
+            <a:r>
+              <a:rPr sz="2400">
+                <a:solidFill>
+                  <a:srgbClr val="FFFFFF"/>
+                </a:solidFill>
+                <a:latin typeface="Times New Roman"/>
+              </a:rPr>
+              <a:t>My mum always avoids ___ home from work at 5 p.m．as there’s so</a:t>
+            </a:r>
+            <a:br/>
+            <a:r>
+              <a:rPr sz="2400">
+                <a:solidFill>
+                  <a:srgbClr val="FFFFFF"/>
+                </a:solidFill>
+                <a:latin typeface="Times New Roman"/>
+              </a:rPr>
+              <a:t>much traffic then.</a:t>
+            </a:r>
+            <a:br/>
+            <a:r>
+              <a:rPr sz="2400">
+                <a:solidFill>
+                  <a:srgbClr val="FFFFFF"/>
+                </a:solidFill>
+                <a:latin typeface="Times New Roman"/>
+              </a:rPr>
               <a:t>A．travel</a:t>
             </a:r>
             <a:br/>
             <a:r>
+              <a:rPr sz="2400">
+                <a:solidFill>
+                  <a:srgbClr val="FFFFFF"/>
+                </a:solidFill>
+                <a:latin typeface="Times New Roman"/>
+              </a:rPr>
               <a:t>B．travelling</a:t>
             </a:r>
             <a:br/>
             <a:r>
+              <a:rPr sz="2400">
+                <a:solidFill>
+                  <a:srgbClr val="FFFFFF"/>
+                </a:solidFill>
+                <a:latin typeface="Times New Roman"/>
+              </a:rPr>
               <a:t>C．to travel</a:t>
             </a:r>
             <a:br/>
             <a:r>
+              <a:rPr sz="2400">
+                <a:solidFill>
+                  <a:srgbClr val="FFFFFF"/>
+                </a:solidFill>
+                <a:latin typeface="Times New Roman"/>
+              </a:rPr>
               <a:t>D．to travelling</a:t>
             </a:r>
           </a:p>
@@ -2398,31 +2670,53 @@
           <a:lstStyle/>
           <a:p/>
           <a:p>
-            <a:pPr>
-              <a:defRPr sz="1600">
-                <a:solidFill>
-                  <a:srgbClr val="FFFFFF"/>
-                </a:solidFill>
-                <a:latin typeface="Times New Roman"/>
-              </a:defRPr>
-            </a:pPr>
-            <a:r>
+            <a:r>
+              <a:rPr sz="2400">
+                <a:solidFill>
+                  <a:srgbClr val="FFFFFF"/>
+                </a:solidFill>
+                <a:latin typeface="Times New Roman"/>
+              </a:rPr>
               <a:t>We need to do something soon, ___ the problem will get worse.</a:t>
             </a:r>
             <a:br/>
             <a:r>
+              <a:rPr sz="2400">
+                <a:solidFill>
+                  <a:srgbClr val="FFFFFF"/>
+                </a:solidFill>
+                <a:latin typeface="Times New Roman"/>
+              </a:rPr>
               <a:t>A．and</a:t>
             </a:r>
             <a:br/>
             <a:r>
+              <a:rPr sz="2400">
+                <a:solidFill>
+                  <a:srgbClr val="FFFFFF"/>
+                </a:solidFill>
+                <a:latin typeface="Times New Roman"/>
+              </a:rPr>
               <a:t>B．but</a:t>
             </a:r>
             <a:br/>
             <a:r>
+              <a:rPr sz="2400">
+                <a:solidFill>
+                  <a:srgbClr val="FFFFFF"/>
+                </a:solidFill>
+                <a:latin typeface="Times New Roman"/>
+              </a:rPr>
               <a:t>C．or</a:t>
             </a:r>
             <a:br/>
             <a:r>
+              <a:rPr sz="2400">
+                <a:solidFill>
+                  <a:srgbClr val="FFFFFF"/>
+                </a:solidFill>
+                <a:latin typeface="Times New Roman"/>
+              </a:rPr>
               <a:t>D．so</a:t>
             </a:r>
           </a:p>
@@ -2720,31 +3014,63 @@
           <a:lstStyle/>
           <a:p/>
           <a:p>
-            <a:pPr>
-              <a:defRPr sz="1600">
-                <a:solidFill>
-                  <a:srgbClr val="FFFFFF"/>
-                </a:solidFill>
-                <a:latin typeface="Times New Roman"/>
-              </a:defRPr>
-            </a:pPr>
-            <a:r>
-              <a:t>If you ___ a list of things that you have to do, you won’t forget to do them.</a:t>
-            </a:r>
-            <a:br/>
-            <a:r>
+            <a:r>
+              <a:rPr sz="2400">
+                <a:solidFill>
+                  <a:srgbClr val="FFFFFF"/>
+                </a:solidFill>
+                <a:latin typeface="Times New Roman"/>
+              </a:rPr>
+              <a:t>If you ___ a list of things that you have to do, you won’t</a:t>
+            </a:r>
+            <a:br/>
+            <a:r>
+              <a:rPr sz="2400">
+                <a:solidFill>
+                  <a:srgbClr val="FFFFFF"/>
+                </a:solidFill>
+                <a:latin typeface="Times New Roman"/>
+              </a:rPr>
+              <a:t>forget to do them.</a:t>
+            </a:r>
+            <a:br/>
+            <a:r>
+              <a:rPr sz="2400">
+                <a:solidFill>
+                  <a:srgbClr val="FFFFFF"/>
+                </a:solidFill>
+                <a:latin typeface="Times New Roman"/>
+              </a:rPr>
               <a:t>A．make</a:t>
             </a:r>
             <a:br/>
             <a:r>
+              <a:rPr sz="2400">
+                <a:solidFill>
+                  <a:srgbClr val="FFFFFF"/>
+                </a:solidFill>
+                <a:latin typeface="Times New Roman"/>
+              </a:rPr>
               <a:t>B．will make</a:t>
             </a:r>
             <a:br/>
             <a:r>
+              <a:rPr sz="2400">
+                <a:solidFill>
+                  <a:srgbClr val="FFFFFF"/>
+                </a:solidFill>
+                <a:latin typeface="Times New Roman"/>
+              </a:rPr>
               <a:t>C．made</a:t>
             </a:r>
             <a:br/>
             <a:r>
+              <a:rPr sz="2400">
+                <a:solidFill>
+                  <a:srgbClr val="FFFFFF"/>
+                </a:solidFill>
+                <a:latin typeface="Times New Roman"/>
+              </a:rPr>
               <a:t>D．are making</a:t>
             </a:r>
           </a:p>
@@ -2925,31 +3251,63 @@
           <a:lstStyle/>
           <a:p/>
           <a:p>
-            <a:pPr>
-              <a:defRPr sz="1600">
-                <a:solidFill>
-                  <a:srgbClr val="FFFFFF"/>
-                </a:solidFill>
-                <a:latin typeface="Times New Roman"/>
-              </a:defRPr>
-            </a:pPr>
-            <a:r>
-              <a:t>My friend never received my post card．I’m afraid it ___ to the wrong address.</a:t>
-            </a:r>
-            <a:br/>
-            <a:r>
+            <a:r>
+              <a:rPr sz="2400">
+                <a:solidFill>
+                  <a:srgbClr val="FFFFFF"/>
+                </a:solidFill>
+                <a:latin typeface="Times New Roman"/>
+              </a:rPr>
+              <a:t>My friend never received my post card．I’m afraid it ___ to the</a:t>
+            </a:r>
+            <a:br/>
+            <a:r>
+              <a:rPr sz="2400">
+                <a:solidFill>
+                  <a:srgbClr val="FFFFFF"/>
+                </a:solidFill>
+                <a:latin typeface="Times New Roman"/>
+              </a:rPr>
+              <a:t>wrong address.</a:t>
+            </a:r>
+            <a:br/>
+            <a:r>
+              <a:rPr sz="2400">
+                <a:solidFill>
+                  <a:srgbClr val="FFFFFF"/>
+                </a:solidFill>
+                <a:latin typeface="Times New Roman"/>
+              </a:rPr>
               <a:t>A．sends</a:t>
             </a:r>
             <a:br/>
             <a:r>
+              <a:rPr sz="2400">
+                <a:solidFill>
+                  <a:srgbClr val="FFFFFF"/>
+                </a:solidFill>
+                <a:latin typeface="Times New Roman"/>
+              </a:rPr>
               <a:t>B．sent</a:t>
             </a:r>
             <a:br/>
             <a:r>
+              <a:rPr sz="2400">
+                <a:solidFill>
+                  <a:srgbClr val="FFFFFF"/>
+                </a:solidFill>
+                <a:latin typeface="Times New Roman"/>
+              </a:rPr>
               <a:t>C．was sent</a:t>
             </a:r>
             <a:br/>
             <a:r>
+              <a:rPr sz="2400">
+                <a:solidFill>
+                  <a:srgbClr val="FFFFFF"/>
+                </a:solidFill>
+                <a:latin typeface="Times New Roman"/>
+              </a:rPr>
               <a:t>D．be sent</a:t>
             </a:r>
           </a:p>
@@ -3130,31 +3488,63 @@
           <a:lstStyle/>
           <a:p/>
           <a:p>
-            <a:pPr>
-              <a:defRPr sz="1600">
-                <a:solidFill>
-                  <a:srgbClr val="FFFFFF"/>
-                </a:solidFill>
-                <a:latin typeface="Times New Roman"/>
-              </a:defRPr>
-            </a:pPr>
-            <a:r>
-              <a:t>We decided to see the town on a guided tour ______ someone would show us the sights.</a:t>
-            </a:r>
-            <a:br/>
-            <a:r>
+            <a:r>
+              <a:rPr sz="2400">
+                <a:solidFill>
+                  <a:srgbClr val="FFFFFF"/>
+                </a:solidFill>
+                <a:latin typeface="Times New Roman"/>
+              </a:rPr>
+              <a:t>We decided to see the town on a guided tour ______ someone</a:t>
+            </a:r>
+            <a:br/>
+            <a:r>
+              <a:rPr sz="2400">
+                <a:solidFill>
+                  <a:srgbClr val="FFFFFF"/>
+                </a:solidFill>
+                <a:latin typeface="Times New Roman"/>
+              </a:rPr>
+              <a:t>would show us the sights.</a:t>
+            </a:r>
+            <a:br/>
+            <a:r>
+              <a:rPr sz="2400">
+                <a:solidFill>
+                  <a:srgbClr val="FFFFFF"/>
+                </a:solidFill>
+                <a:latin typeface="Times New Roman"/>
+              </a:rPr>
               <a:t>A．unless</a:t>
             </a:r>
             <a:br/>
             <a:r>
+              <a:rPr sz="2400">
+                <a:solidFill>
+                  <a:srgbClr val="FFFFFF"/>
+                </a:solidFill>
+                <a:latin typeface="Times New Roman"/>
+              </a:rPr>
               <a:t>B．because</a:t>
             </a:r>
             <a:br/>
             <a:r>
+              <a:rPr sz="2400">
+                <a:solidFill>
+                  <a:srgbClr val="FFFFFF"/>
+                </a:solidFill>
+                <a:latin typeface="Times New Roman"/>
+              </a:rPr>
               <a:t>C．when</a:t>
             </a:r>
             <a:br/>
             <a:r>
+              <a:rPr sz="2400">
+                <a:solidFill>
+                  <a:srgbClr val="FFFFFF"/>
+                </a:solidFill>
+                <a:latin typeface="Times New Roman"/>
+              </a:rPr>
               <a:t>D．so that</a:t>
             </a:r>
           </a:p>
@@ -3335,31 +3725,63 @@
           <a:lstStyle/>
           <a:p/>
           <a:p>
-            <a:pPr>
-              <a:defRPr sz="1600">
-                <a:solidFill>
-                  <a:srgbClr val="FFFFFF"/>
-                </a:solidFill>
-                <a:latin typeface="Times New Roman"/>
-              </a:defRPr>
-            </a:pPr>
-            <a:r>
-              <a:t>___ exhausting day I’ve had! I’m so tired and dirty from walking so many miles.</a:t>
-            </a:r>
-            <a:br/>
-            <a:r>
+            <a:r>
+              <a:rPr sz="2400">
+                <a:solidFill>
+                  <a:srgbClr val="FFFFFF"/>
+                </a:solidFill>
+                <a:latin typeface="Times New Roman"/>
+              </a:rPr>
+              <a:t>___ exhausting day I’ve had! I’m so tired and dirty from</a:t>
+            </a:r>
+            <a:br/>
+            <a:r>
+              <a:rPr sz="2400">
+                <a:solidFill>
+                  <a:srgbClr val="FFFFFF"/>
+                </a:solidFill>
+                <a:latin typeface="Times New Roman"/>
+              </a:rPr>
+              <a:t>walking so many miles.</a:t>
+            </a:r>
+            <a:br/>
+            <a:r>
+              <a:rPr sz="2400">
+                <a:solidFill>
+                  <a:srgbClr val="FFFFFF"/>
+                </a:solidFill>
+                <a:latin typeface="Times New Roman"/>
+              </a:rPr>
               <a:t>A．What</a:t>
             </a:r>
             <a:br/>
             <a:r>
+              <a:rPr sz="2400">
+                <a:solidFill>
+                  <a:srgbClr val="FFFFFF"/>
+                </a:solidFill>
+                <a:latin typeface="Times New Roman"/>
+              </a:rPr>
               <a:t>B．What a</a:t>
             </a:r>
             <a:br/>
             <a:r>
+              <a:rPr sz="2400">
+                <a:solidFill>
+                  <a:srgbClr val="FFFFFF"/>
+                </a:solidFill>
+                <a:latin typeface="Times New Roman"/>
+              </a:rPr>
               <a:t>C．What an</a:t>
             </a:r>
             <a:br/>
             <a:r>
+              <a:rPr sz="2400">
+                <a:solidFill>
+                  <a:srgbClr val="FFFFFF"/>
+                </a:solidFill>
+                <a:latin typeface="Times New Roman"/>
+              </a:rPr>
               <a:t>D．How</a:t>
             </a:r>
           </a:p>
@@ -3540,31 +3962,53 @@
           <a:lstStyle/>
           <a:p/>
           <a:p>
-            <a:pPr>
-              <a:defRPr sz="1600">
-                <a:solidFill>
-                  <a:srgbClr val="FFFFFF"/>
-                </a:solidFill>
-                <a:latin typeface="Times New Roman"/>
-              </a:defRPr>
-            </a:pPr>
-            <a:r>
+            <a:r>
+              <a:rPr sz="2400">
+                <a:solidFill>
+                  <a:srgbClr val="FFFFFF"/>
+                </a:solidFill>
+                <a:latin typeface="Times New Roman"/>
+              </a:rPr>
               <a:t>Our decision ___ for some drink made us late for the train.</a:t>
             </a:r>
             <a:br/>
             <a:r>
+              <a:rPr sz="2400">
+                <a:solidFill>
+                  <a:srgbClr val="FFFFFF"/>
+                </a:solidFill>
+                <a:latin typeface="Times New Roman"/>
+              </a:rPr>
               <a:t>A．stop</a:t>
             </a:r>
             <a:br/>
             <a:r>
+              <a:rPr sz="2400">
+                <a:solidFill>
+                  <a:srgbClr val="FFFFFF"/>
+                </a:solidFill>
+                <a:latin typeface="Times New Roman"/>
+              </a:rPr>
               <a:t>B．to stop</a:t>
             </a:r>
             <a:br/>
             <a:r>
+              <a:rPr sz="2400">
+                <a:solidFill>
+                  <a:srgbClr val="FFFFFF"/>
+                </a:solidFill>
+                <a:latin typeface="Times New Roman"/>
+              </a:rPr>
               <a:t>C．stopping</a:t>
             </a:r>
             <a:br/>
             <a:r>
+              <a:rPr sz="2400">
+                <a:solidFill>
+                  <a:srgbClr val="FFFFFF"/>
+                </a:solidFill>
+                <a:latin typeface="Times New Roman"/>
+              </a:rPr>
               <a:t>D．to stopping</a:t>
             </a:r>
           </a:p>
@@ -3745,35 +4189,63 @@
           <a:lstStyle/>
           <a:p/>
           <a:p>
-            <a:pPr>
-              <a:defRPr sz="1600">
-                <a:solidFill>
-                  <a:srgbClr val="FFFFFF"/>
-                </a:solidFill>
-                <a:latin typeface="Times New Roman"/>
-              </a:defRPr>
-            </a:pPr>
-            <a:r>
+            <a:r>
+              <a:rPr sz="2400">
+                <a:solidFill>
+                  <a:srgbClr val="FFFFFF"/>
+                </a:solidFill>
+                <a:latin typeface="Times New Roman"/>
+              </a:rPr>
               <a:t>–I think university is a waste of time.</a:t>
             </a:r>
             <a:br/>
             <a:r>
+              <a:rPr sz="2400">
+                <a:solidFill>
+                  <a:srgbClr val="FFFFFF"/>
+                </a:solidFill>
+                <a:latin typeface="Times New Roman"/>
+              </a:rPr>
               <a:t>–___ A university degree is important for some jobs.</a:t>
             </a:r>
             <a:br/>
             <a:r>
+              <a:rPr sz="2400">
+                <a:solidFill>
+                  <a:srgbClr val="FFFFFF"/>
+                </a:solidFill>
+                <a:latin typeface="Times New Roman"/>
+              </a:rPr>
               <a:t>A．Yes, maybe you’re right.</a:t>
             </a:r>
             <a:br/>
             <a:r>
+              <a:rPr sz="2400">
+                <a:solidFill>
+                  <a:srgbClr val="FFFFFF"/>
+                </a:solidFill>
+                <a:latin typeface="Times New Roman"/>
+              </a:rPr>
               <a:t>B．Let me think about it.</a:t>
             </a:r>
             <a:br/>
             <a:r>
+              <a:rPr sz="2400">
+                <a:solidFill>
+                  <a:srgbClr val="FFFFFF"/>
+                </a:solidFill>
+                <a:latin typeface="Times New Roman"/>
+              </a:rPr>
               <a:t>C．I’d prefer to find a job.</a:t>
             </a:r>
             <a:br/>
             <a:r>
+              <a:rPr sz="2400">
+                <a:solidFill>
+                  <a:srgbClr val="FFFFFF"/>
+                </a:solidFill>
+                <a:latin typeface="Times New Roman"/>
+              </a:rPr>
               <a:t>D．I’m sorry I don’t agree.</a:t>
             </a:r>
           </a:p>
@@ -3837,31 +4309,53 @@
           <a:lstStyle/>
           <a:p/>
           <a:p>
-            <a:pPr>
-              <a:defRPr sz="1600">
-                <a:solidFill>
-                  <a:srgbClr val="FFFFFF"/>
-                </a:solidFill>
-                <a:latin typeface="Times New Roman"/>
-              </a:defRPr>
-            </a:pPr>
-            <a:r>
+            <a:r>
+              <a:rPr sz="2400">
+                <a:solidFill>
+                  <a:srgbClr val="FFFFFF"/>
+                </a:solidFill>
+                <a:latin typeface="Times New Roman"/>
+              </a:rPr>
               <a:t>Which of the underlined parts is different in pronunciation?</a:t>
             </a:r>
             <a:br/>
             <a:r>
+              <a:rPr sz="2400">
+                <a:solidFill>
+                  <a:srgbClr val="FFFFFF"/>
+                </a:solidFill>
+                <a:latin typeface="Times New Roman"/>
+              </a:rPr>
               <a:t>A．matter</a:t>
             </a:r>
             <a:br/>
             <a:r>
+              <a:rPr sz="2400">
+                <a:solidFill>
+                  <a:srgbClr val="FFFFFF"/>
+                </a:solidFill>
+                <a:latin typeface="Times New Roman"/>
+              </a:rPr>
               <a:t>B．damage</a:t>
             </a:r>
             <a:br/>
             <a:r>
+              <a:rPr sz="2400">
+                <a:solidFill>
+                  <a:srgbClr val="FFFFFF"/>
+                </a:solidFill>
+                <a:latin typeface="Times New Roman"/>
+              </a:rPr>
               <a:t>C．native</a:t>
             </a:r>
             <a:br/>
             <a:r>
+              <a:rPr sz="2400">
+                <a:solidFill>
+                  <a:srgbClr val="FFFFFF"/>
+                </a:solidFill>
+                <a:latin typeface="Times New Roman"/>
+              </a:rPr>
               <a:t>D．magic</a:t>
             </a:r>
           </a:p>
@@ -4496,16 +4990,24 @@
           <a:lstStyle/>
           <a:p/>
           <a:p>
-            <a:pPr>
-              <a:defRPr sz="1600">
-                <a:solidFill>
-                  <a:srgbClr val="FFFFFF"/>
-                </a:solidFill>
-                <a:latin typeface="Times New Roman"/>
-              </a:defRPr>
-            </a:pPr>
-            <a:r>
-              <a:t>There are _______ tigers than there were a hundred years ago.（few）</a:t>
+            <a:r>
+              <a:rPr sz="2400">
+                <a:solidFill>
+                  <a:srgbClr val="FFFFFF"/>
+                </a:solidFill>
+                <a:latin typeface="Times New Roman"/>
+              </a:rPr>
+              <a:t>There are _______ tigers than there were a hundred years</a:t>
+            </a:r>
+            <a:br/>
+            <a:r>
+              <a:rPr sz="2400">
+                <a:solidFill>
+                  <a:srgbClr val="FFFFFF"/>
+                </a:solidFill>
+                <a:latin typeface="Times New Roman"/>
+              </a:rPr>
+              <a:t>ago.（few）</a:t>
             </a:r>
           </a:p>
         </p:txBody>
@@ -4685,16 +5187,24 @@
           <a:lstStyle/>
           <a:p/>
           <a:p>
-            <a:pPr>
-              <a:defRPr sz="1600">
-                <a:solidFill>
-                  <a:srgbClr val="FFFFFF"/>
-                </a:solidFill>
-                <a:latin typeface="Times New Roman"/>
-              </a:defRPr>
-            </a:pPr>
-            <a:r>
-              <a:t>Here are some hot _______ for what to expect while visiting Canada’s largest city.（tip）</a:t>
+            <a:r>
+              <a:rPr sz="2400">
+                <a:solidFill>
+                  <a:srgbClr val="FFFFFF"/>
+                </a:solidFill>
+                <a:latin typeface="Times New Roman"/>
+              </a:rPr>
+              <a:t>Here are some hot _______ for what to expect while visiting</a:t>
+            </a:r>
+            <a:br/>
+            <a:r>
+              <a:rPr sz="2400">
+                <a:solidFill>
+                  <a:srgbClr val="FFFFFF"/>
+                </a:solidFill>
+                <a:latin typeface="Times New Roman"/>
+              </a:rPr>
+              <a:t>Canada’s largest city.（tip）</a:t>
             </a:r>
           </a:p>
         </p:txBody>
@@ -4991,16 +5501,24 @@
           <a:lstStyle/>
           <a:p/>
           <a:p>
-            <a:pPr>
-              <a:defRPr sz="1600">
-                <a:solidFill>
-                  <a:srgbClr val="FFFFFF"/>
-                </a:solidFill>
-                <a:latin typeface="Times New Roman"/>
-              </a:defRPr>
-            </a:pPr>
-            <a:r>
-              <a:t>As a result of the bloods, six people died and thousands were made _______.（home）</a:t>
+            <a:r>
+              <a:rPr sz="2400">
+                <a:solidFill>
+                  <a:srgbClr val="FFFFFF"/>
+                </a:solidFill>
+                <a:latin typeface="Times New Roman"/>
+              </a:rPr>
+              <a:t>As a result of the bloods, six people died and thousands were</a:t>
+            </a:r>
+            <a:br/>
+            <a:r>
+              <a:rPr sz="2400">
+                <a:solidFill>
+                  <a:srgbClr val="FFFFFF"/>
+                </a:solidFill>
+                <a:latin typeface="Times New Roman"/>
+              </a:rPr>
+              <a:t>made _______.（home）</a:t>
             </a:r>
           </a:p>
         </p:txBody>
@@ -5180,16 +5698,24 @@
           <a:lstStyle/>
           <a:p/>
           <a:p>
-            <a:pPr>
-              <a:defRPr sz="1600">
-                <a:solidFill>
-                  <a:srgbClr val="FFFFFF"/>
-                </a:solidFill>
-                <a:latin typeface="Times New Roman"/>
-              </a:defRPr>
-            </a:pPr>
-            <a:r>
-              <a:t>The book talks about why we need to protect endangered species to save ________.（we）</a:t>
+            <a:r>
+              <a:rPr sz="2400">
+                <a:solidFill>
+                  <a:srgbClr val="FFFFFF"/>
+                </a:solidFill>
+                <a:latin typeface="Times New Roman"/>
+              </a:rPr>
+              <a:t>The book talks about why we need to protect endangered species</a:t>
+            </a:r>
+            <a:br/>
+            <a:r>
+              <a:rPr sz="2400">
+                <a:solidFill>
+                  <a:srgbClr val="FFFFFF"/>
+                </a:solidFill>
+                <a:latin typeface="Times New Roman"/>
+              </a:rPr>
+              <a:t>to save ________.（we）</a:t>
             </a:r>
           </a:p>
         </p:txBody>
@@ -5369,16 +5895,24 @@
           <a:lstStyle/>
           <a:p/>
           <a:p>
-            <a:pPr>
-              <a:defRPr sz="1600">
-                <a:solidFill>
-                  <a:srgbClr val="FFFFFF"/>
-                </a:solidFill>
-                <a:latin typeface="Times New Roman"/>
-              </a:defRPr>
-            </a:pPr>
-            <a:r>
-              <a:t>A good travel agent knows that a _______ customer will always come back.（satisfying）</a:t>
+            <a:r>
+              <a:rPr sz="2400">
+                <a:solidFill>
+                  <a:srgbClr val="FFFFFF"/>
+                </a:solidFill>
+                <a:latin typeface="Times New Roman"/>
+              </a:rPr>
+              <a:t>A good travel agent knows that a _______ customer will always</a:t>
+            </a:r>
+            <a:br/>
+            <a:r>
+              <a:rPr sz="2400">
+                <a:solidFill>
+                  <a:srgbClr val="FFFFFF"/>
+                </a:solidFill>
+                <a:latin typeface="Times New Roman"/>
+              </a:rPr>
+              <a:t>come back.（satisfying）</a:t>
             </a:r>
           </a:p>
         </p:txBody>
@@ -5558,16 +6092,24 @@
           <a:lstStyle/>
           <a:p/>
           <a:p>
-            <a:pPr>
-              <a:defRPr sz="1600">
-                <a:solidFill>
-                  <a:srgbClr val="FFFFFF"/>
-                </a:solidFill>
-                <a:latin typeface="Times New Roman"/>
-              </a:defRPr>
-            </a:pPr>
-            <a:r>
-              <a:t>Please pack these things very _______. I don’t want anything to get broken.（careful）</a:t>
+            <a:r>
+              <a:rPr sz="2400">
+                <a:solidFill>
+                  <a:srgbClr val="FFFFFF"/>
+                </a:solidFill>
+                <a:latin typeface="Times New Roman"/>
+              </a:rPr>
+              <a:t>Please pack these things very _______. I don’t want anything to</a:t>
+            </a:r>
+            <a:br/>
+            <a:r>
+              <a:rPr sz="2400">
+                <a:solidFill>
+                  <a:srgbClr val="FFFFFF"/>
+                </a:solidFill>
+                <a:latin typeface="Times New Roman"/>
+              </a:rPr>
+              <a:t>get broken.（careful）</a:t>
             </a:r>
           </a:p>
         </p:txBody>
@@ -5747,16 +6289,24 @@
           <a:lstStyle/>
           <a:p/>
           <a:p>
-            <a:pPr>
-              <a:defRPr sz="1600">
-                <a:solidFill>
-                  <a:srgbClr val="FFFFFF"/>
-                </a:solidFill>
-                <a:latin typeface="Times New Roman"/>
-              </a:defRPr>
-            </a:pPr>
-            <a:r>
-              <a:t>Labels on our products may _______ us into throwing food away too soon.（foolish）</a:t>
+            <a:r>
+              <a:rPr sz="2400">
+                <a:solidFill>
+                  <a:srgbClr val="FFFFFF"/>
+                </a:solidFill>
+                <a:latin typeface="Times New Roman"/>
+              </a:rPr>
+              <a:t>Labels on our products may _______ us into throwing food away</a:t>
+            </a:r>
+            <a:br/>
+            <a:r>
+              <a:rPr sz="2400">
+                <a:solidFill>
+                  <a:srgbClr val="FFFFFF"/>
+                </a:solidFill>
+                <a:latin typeface="Times New Roman"/>
+              </a:rPr>
+              <a:t>too soon.（foolish）</a:t>
             </a:r>
           </a:p>
         </p:txBody>
@@ -5936,31 +6486,53 @@
           <a:lstStyle/>
           <a:p/>
           <a:p>
-            <a:pPr>
-              <a:defRPr sz="1600">
-                <a:solidFill>
-                  <a:srgbClr val="FFFFFF"/>
-                </a:solidFill>
-                <a:latin typeface="Times New Roman"/>
-              </a:defRPr>
-            </a:pPr>
-            <a:r>
+            <a:r>
+              <a:rPr sz="2400">
+                <a:solidFill>
+                  <a:srgbClr val="FFFFFF"/>
+                </a:solidFill>
+                <a:latin typeface="Times New Roman"/>
+              </a:rPr>
               <a:t>We left in such ____ hurry that we forgot our passports.</a:t>
             </a:r>
             <a:br/>
             <a:r>
+              <a:rPr sz="2400">
+                <a:solidFill>
+                  <a:srgbClr val="FFFFFF"/>
+                </a:solidFill>
+                <a:latin typeface="Times New Roman"/>
+              </a:rPr>
               <a:t>A．a</a:t>
             </a:r>
             <a:br/>
             <a:r>
+              <a:rPr sz="2400">
+                <a:solidFill>
+                  <a:srgbClr val="FFFFFF"/>
+                </a:solidFill>
+                <a:latin typeface="Times New Roman"/>
+              </a:rPr>
               <a:t>B．an</a:t>
             </a:r>
             <a:br/>
             <a:r>
+              <a:rPr sz="2400">
+                <a:solidFill>
+                  <a:srgbClr val="FFFFFF"/>
+                </a:solidFill>
+                <a:latin typeface="Times New Roman"/>
+              </a:rPr>
               <a:t>C．the</a:t>
             </a:r>
             <a:br/>
             <a:r>
+              <a:rPr sz="2400">
+                <a:solidFill>
+                  <a:srgbClr val="FFFFFF"/>
+                </a:solidFill>
+                <a:latin typeface="Times New Roman"/>
+              </a:rPr>
               <a:t>D．/</a:t>
             </a:r>
           </a:p>
@@ -6024,16 +6596,24 @@
           <a:lstStyle/>
           <a:p/>
           <a:p>
-            <a:pPr>
-              <a:defRPr sz="1600">
-                <a:solidFill>
-                  <a:srgbClr val="FFFFFF"/>
-                </a:solidFill>
-                <a:latin typeface="Times New Roman"/>
-              </a:defRPr>
-            </a:pPr>
-            <a:r>
-              <a:t>Some interesting things came up in our ________ yesterday.（discuss）</a:t>
+            <a:r>
+              <a:rPr sz="2400">
+                <a:solidFill>
+                  <a:srgbClr val="FFFFFF"/>
+                </a:solidFill>
+                <a:latin typeface="Times New Roman"/>
+              </a:rPr>
+              <a:t>Some interesting things came up in our ________</a:t>
+            </a:r>
+            <a:br/>
+            <a:r>
+              <a:rPr sz="2400">
+                <a:solidFill>
+                  <a:srgbClr val="FFFFFF"/>
+                </a:solidFill>
+                <a:latin typeface="Times New Roman"/>
+              </a:rPr>
+              <a:t>yesterday.（discuss）</a:t>
             </a:r>
           </a:p>
         </p:txBody>
@@ -6213,19 +6793,23 @@
           <a:lstStyle/>
           <a:p/>
           <a:p>
-            <a:pPr>
-              <a:defRPr sz="1600">
-                <a:solidFill>
-                  <a:srgbClr val="FFFFFF"/>
-                </a:solidFill>
-                <a:latin typeface="Times New Roman"/>
-              </a:defRPr>
-            </a:pPr>
-            <a:r>
+            <a:r>
+              <a:rPr sz="2400">
+                <a:solidFill>
+                  <a:srgbClr val="FFFFFF"/>
+                </a:solidFill>
+                <a:latin typeface="Times New Roman"/>
+              </a:rPr>
               <a:t>My father fell asleep during the movie.（改为一般疑问句）</a:t>
             </a:r>
             <a:br/>
             <a:r>
+              <a:rPr sz="2400">
+                <a:solidFill>
+                  <a:srgbClr val="FFFFFF"/>
+                </a:solidFill>
+                <a:latin typeface="Times New Roman"/>
+              </a:rPr>
               <a:t>_______ your father _______ asleep during the movie?</a:t>
             </a:r>
           </a:p>
@@ -6406,19 +6990,23 @@
           <a:lstStyle/>
           <a:p/>
           <a:p>
-            <a:pPr>
-              <a:defRPr sz="1600">
-                <a:solidFill>
-                  <a:srgbClr val="FFFFFF"/>
-                </a:solidFill>
-                <a:latin typeface="Times New Roman"/>
-              </a:defRPr>
-            </a:pPr>
-            <a:r>
+            <a:r>
+              <a:rPr sz="2400">
+                <a:solidFill>
+                  <a:srgbClr val="FFFFFF"/>
+                </a:solidFill>
+                <a:latin typeface="Times New Roman"/>
+              </a:rPr>
               <a:t>I’m going to New York to see Liberty Statue.（对划线部分提问）</a:t>
             </a:r>
             <a:br/>
             <a:r>
+              <a:rPr sz="2400">
+                <a:solidFill>
+                  <a:srgbClr val="FFFFFF"/>
+                </a:solidFill>
+                <a:latin typeface="Times New Roman"/>
+              </a:rPr>
               <a:t>_______ _______ you going to New York?</a:t>
             </a:r>
           </a:p>
@@ -6599,20 +7187,44 @@
           <a:lstStyle/>
           <a:p/>
           <a:p>
-            <a:pPr>
-              <a:defRPr sz="1600">
-                <a:solidFill>
-                  <a:srgbClr val="FFFFFF"/>
-                </a:solidFill>
-                <a:latin typeface="Times New Roman"/>
-              </a:defRPr>
-            </a:pPr>
-            <a:r>
-              <a:t>“We will do a a project on the environment next week.”said my teacher.（保持句意基本不变）</a:t>
-            </a:r>
-            <a:br/>
-            <a:r>
-              <a:t>My teacher said we _______ _______ a project on the environment the next week.</a:t>
+            <a:r>
+              <a:rPr sz="2400">
+                <a:solidFill>
+                  <a:srgbClr val="FFFFFF"/>
+                </a:solidFill>
+                <a:latin typeface="Times New Roman"/>
+              </a:rPr>
+              <a:t>“We will do a a project on the environment next week.”said my</a:t>
+            </a:r>
+            <a:br/>
+            <a:r>
+              <a:rPr sz="2400">
+                <a:solidFill>
+                  <a:srgbClr val="FFFFFF"/>
+                </a:solidFill>
+                <a:latin typeface="Times New Roman"/>
+              </a:rPr>
+              <a:t>teacher.（保持句意基本不变）</a:t>
+            </a:r>
+            <a:br/>
+            <a:r>
+              <a:rPr sz="2400">
+                <a:solidFill>
+                  <a:srgbClr val="FFFFFF"/>
+                </a:solidFill>
+                <a:latin typeface="Times New Roman"/>
+              </a:rPr>
+              <a:t>My teacher said we _______ _______ a project on the environment</a:t>
+            </a:r>
+            <a:br/>
+            <a:r>
+              <a:rPr sz="2400">
+                <a:solidFill>
+                  <a:srgbClr val="FFFFFF"/>
+                </a:solidFill>
+                <a:latin typeface="Times New Roman"/>
+              </a:rPr>
+              <a:t>the next week.</a:t>
             </a:r>
           </a:p>
         </p:txBody>
@@ -6792,20 +7404,44 @@
           <a:lstStyle/>
           <a:p/>
           <a:p>
-            <a:pPr>
-              <a:defRPr sz="1600">
-                <a:solidFill>
-                  <a:srgbClr val="FFFFFF"/>
-                </a:solidFill>
-                <a:latin typeface="Times New Roman"/>
-              </a:defRPr>
-            </a:pPr>
-            <a:r>
-              <a:t>She felt very happy when she heard Victor’s voice on the line.（保持句意基本不变）</a:t>
-            </a:r>
-            <a:br/>
-            <a:r>
-              <a:t>_______ _______ great joy, she heard Victor’s voice on the line.</a:t>
+            <a:r>
+              <a:rPr sz="2400">
+                <a:solidFill>
+                  <a:srgbClr val="FFFFFF"/>
+                </a:solidFill>
+                <a:latin typeface="Times New Roman"/>
+              </a:rPr>
+              <a:t>She felt very happy when she heard Victor’s voice on the</a:t>
+            </a:r>
+            <a:br/>
+            <a:r>
+              <a:rPr sz="2400">
+                <a:solidFill>
+                  <a:srgbClr val="FFFFFF"/>
+                </a:solidFill>
+                <a:latin typeface="Times New Roman"/>
+              </a:rPr>
+              <a:t>line.（保持句意基本不变）</a:t>
+            </a:r>
+            <a:br/>
+            <a:r>
+              <a:rPr sz="2400">
+                <a:solidFill>
+                  <a:srgbClr val="FFFFFF"/>
+                </a:solidFill>
+                <a:latin typeface="Times New Roman"/>
+              </a:rPr>
+              <a:t>_______ _______ great joy, she heard Victor’s voice on the</a:t>
+            </a:r>
+            <a:br/>
+            <a:r>
+              <a:rPr sz="2400">
+                <a:solidFill>
+                  <a:srgbClr val="FFFFFF"/>
+                </a:solidFill>
+                <a:latin typeface="Times New Roman"/>
+              </a:rPr>
+              <a:t>line.</a:t>
             </a:r>
           </a:p>
         </p:txBody>
@@ -7102,19 +7738,33 @@
           <a:lstStyle/>
           <a:p/>
           <a:p>
-            <a:pPr>
-              <a:defRPr sz="1600">
-                <a:solidFill>
-                  <a:srgbClr val="FFFFFF"/>
-                </a:solidFill>
-                <a:latin typeface="Times New Roman"/>
-              </a:defRPr>
-            </a:pPr>
-            <a:r>
-              <a:t>They have built two new hotels near the airport.（改为被动语态）</a:t>
-            </a:r>
-            <a:br/>
-            <a:r>
+            <a:r>
+              <a:rPr sz="2400">
+                <a:solidFill>
+                  <a:srgbClr val="FFFFFF"/>
+                </a:solidFill>
+                <a:latin typeface="Times New Roman"/>
+              </a:rPr>
+              <a:t>They have built two new hotels near the air</a:t>
+            </a:r>
+            <a:br/>
+            <a:r>
+              <a:rPr sz="2400">
+                <a:solidFill>
+                  <a:srgbClr val="FFFFFF"/>
+                </a:solidFill>
+                <a:latin typeface="Times New Roman"/>
+              </a:rPr>
+              <a:t>port.（改为被动语态）</a:t>
+            </a:r>
+            <a:br/>
+            <a:r>
+              <a:rPr sz="2400">
+                <a:solidFill>
+                  <a:srgbClr val="FFFFFF"/>
+                </a:solidFill>
+                <a:latin typeface="Times New Roman"/>
+              </a:rPr>
               <a:t>Two new hotels have _______ _______ near the airport.</a:t>
             </a:r>
           </a:p>
@@ -7295,19 +7945,23 @@
           <a:lstStyle/>
           <a:p/>
           <a:p>
-            <a:pPr>
-              <a:defRPr sz="1600">
-                <a:solidFill>
-                  <a:srgbClr val="FFFFFF"/>
-                </a:solidFill>
-                <a:latin typeface="Times New Roman"/>
-              </a:defRPr>
-            </a:pPr>
-            <a:r>
+            <a:r>
+              <a:rPr sz="2400">
+                <a:solidFill>
+                  <a:srgbClr val="FFFFFF"/>
+                </a:solidFill>
+                <a:latin typeface="Times New Roman"/>
+              </a:rPr>
               <a:t>The suitcase was too heavy for her to lift.（保持句意基本不变）</a:t>
             </a:r>
             <a:br/>
             <a:r>
+              <a:rPr sz="2400">
+                <a:solidFill>
+                  <a:srgbClr val="FFFFFF"/>
+                </a:solidFill>
+                <a:latin typeface="Times New Roman"/>
+              </a:rPr>
               <a:t>The suitcase was _______ heavy _______ she couldn’t lift it.</a:t>
             </a:r>
           </a:p>
@@ -7488,20 +8142,34 @@
           <a:lstStyle/>
           <a:p/>
           <a:p>
-            <a:pPr>
-              <a:defRPr sz="1600">
-                <a:solidFill>
-                  <a:srgbClr val="FFFFFF"/>
-                </a:solidFill>
-                <a:latin typeface="Times New Roman"/>
-              </a:defRPr>
-            </a:pPr>
-            <a:r>
+            <a:r>
+              <a:rPr sz="2400">
+                <a:solidFill>
+                  <a:srgbClr val="FFFFFF"/>
+                </a:solidFill>
+                <a:latin typeface="Times New Roman"/>
+              </a:rPr>
               <a:t>started, how, wonder, these terrible fires, I（连词成句）</a:t>
             </a:r>
             <a:br/>
             <a:r>
-              <a:t>___________________________________________________________________________</a:t>
+              <a:rPr sz="2400">
+                <a:solidFill>
+                  <a:srgbClr val="FFFFFF"/>
+                </a:solidFill>
+                <a:latin typeface="Times New Roman"/>
+              </a:rPr>
+              <a:t>_______________________________________________________________</a:t>
+            </a:r>
+            <a:br/>
+            <a:r>
+              <a:rPr sz="2400">
+                <a:solidFill>
+                  <a:srgbClr val="FFFFFF"/>
+                </a:solidFill>
+                <a:latin typeface="Times New Roman"/>
+              </a:rPr>
+              <a:t>____________</a:t>
             </a:r>
           </a:p>
         </p:txBody>
@@ -8163,31 +8831,63 @@
           <a:lstStyle/>
           <a:p/>
           <a:p>
-            <a:pPr>
-              <a:defRPr sz="1600">
-                <a:solidFill>
-                  <a:srgbClr val="FFFFFF"/>
-                </a:solidFill>
-                <a:latin typeface="Times New Roman"/>
-              </a:defRPr>
-            </a:pPr>
-            <a:r>
-              <a:t>If you must use a cell phone, please talk ____ a low voice and move to the back.</a:t>
-            </a:r>
-            <a:br/>
-            <a:r>
+            <a:r>
+              <a:rPr sz="2400">
+                <a:solidFill>
+                  <a:srgbClr val="FFFFFF"/>
+                </a:solidFill>
+                <a:latin typeface="Times New Roman"/>
+              </a:rPr>
+              <a:t>If you must use a cell phone, please talk ____ a low voice and</a:t>
+            </a:r>
+            <a:br/>
+            <a:r>
+              <a:rPr sz="2400">
+                <a:solidFill>
+                  <a:srgbClr val="FFFFFF"/>
+                </a:solidFill>
+                <a:latin typeface="Times New Roman"/>
+              </a:rPr>
+              <a:t>move to the back.</a:t>
+            </a:r>
+            <a:br/>
+            <a:r>
+              <a:rPr sz="2400">
+                <a:solidFill>
+                  <a:srgbClr val="FFFFFF"/>
+                </a:solidFill>
+                <a:latin typeface="Times New Roman"/>
+              </a:rPr>
               <a:t>A．to</a:t>
             </a:r>
             <a:br/>
             <a:r>
+              <a:rPr sz="2400">
+                <a:solidFill>
+                  <a:srgbClr val="FFFFFF"/>
+                </a:solidFill>
+                <a:latin typeface="Times New Roman"/>
+              </a:rPr>
               <a:t>B．by</a:t>
             </a:r>
             <a:br/>
             <a:r>
+              <a:rPr sz="2400">
+                <a:solidFill>
+                  <a:srgbClr val="FFFFFF"/>
+                </a:solidFill>
+                <a:latin typeface="Times New Roman"/>
+              </a:rPr>
               <a:t>C．at</a:t>
             </a:r>
             <a:br/>
             <a:r>
+              <a:rPr sz="2400">
+                <a:solidFill>
+                  <a:srgbClr val="FFFFFF"/>
+                </a:solidFill>
+                <a:latin typeface="Times New Roman"/>
+              </a:rPr>
               <a:t>D．in</a:t>
             </a:r>
           </a:p>
@@ -10261,40 +10961,94 @@
           <a:lstStyle/>
           <a:p/>
           <a:p>
-            <a:pPr>
-              <a:defRPr sz="1600">
-                <a:solidFill>
-                  <a:srgbClr val="FFFFFF"/>
-                </a:solidFill>
-                <a:latin typeface="Times New Roman"/>
-              </a:defRPr>
-            </a:pPr>
-            <a:r>
+            <a:r>
+              <a:rPr sz="2400">
+                <a:solidFill>
+                  <a:srgbClr val="FFFFFF"/>
+                </a:solidFill>
+                <a:latin typeface="Times New Roman"/>
+              </a:rPr>
               <a:t>In 60-120 words, write about the topic“A goal I would like to</a:t>
             </a:r>
             <a:br/>
             <a:r>
-              <a:t>achieve”.（以“一个我想实现的目标”为题，写一篇60-120个词的短文，标点符号不占格）</a:t>
-            </a:r>
-            <a:br/>
-            <a:r>
+              <a:rPr sz="2400">
+                <a:solidFill>
+                  <a:srgbClr val="FFFFFF"/>
+                </a:solidFill>
+                <a:latin typeface="Times New Roman"/>
+              </a:rPr>
+              <a:t>achieve”.（以“一个我想实现的目标”为题，写一</a:t>
+            </a:r>
+            <a:br/>
+            <a:r>
+              <a:rPr sz="2400">
+                <a:solidFill>
+                  <a:srgbClr val="FFFFFF"/>
+                </a:solidFill>
+                <a:latin typeface="Times New Roman"/>
+              </a:rPr>
+              <a:t>篇60-120个词的短文，标点符号不占格）</a:t>
+            </a:r>
+            <a:br/>
+            <a:r>
+              <a:rPr sz="2400">
+                <a:solidFill>
+                  <a:srgbClr val="FFFFFF"/>
+                </a:solidFill>
+                <a:latin typeface="Times New Roman"/>
+              </a:rPr>
               <a:t>The following are for reference only.（以下内容仅供参考）</a:t>
             </a:r>
             <a:br/>
             <a:r>
+              <a:rPr sz="2400">
+                <a:solidFill>
+                  <a:srgbClr val="FFFFFF"/>
+                </a:solidFill>
+                <a:latin typeface="Times New Roman"/>
+              </a:rPr>
               <a:t>What is your goal?</a:t>
             </a:r>
             <a:br/>
             <a:r>
+              <a:rPr sz="2400">
+                <a:solidFill>
+                  <a:srgbClr val="FFFFFF"/>
+                </a:solidFill>
+                <a:latin typeface="Times New Roman"/>
+              </a:rPr>
               <a:t>Why do you want to do this?</a:t>
             </a:r>
             <a:br/>
             <a:r>
+              <a:rPr sz="2400">
+                <a:solidFill>
+                  <a:srgbClr val="FFFFFF"/>
+                </a:solidFill>
+                <a:latin typeface="Times New Roman"/>
+              </a:rPr>
               <a:t>How do you plan to achieve your goal?</a:t>
             </a:r>
             <a:br/>
             <a:r>
-              <a:t>（注意：文中不得出现考生的姓名、校名及其他相关信息，否则不予评分。）</a:t>
+              <a:rPr sz="2400">
+                <a:solidFill>
+                  <a:srgbClr val="FFFFFF"/>
+                </a:solidFill>
+                <a:latin typeface="Times New Roman"/>
+              </a:rPr>
+              <a:t>（注意：文中不得出现考生的姓名、校名及其他相</a:t>
+            </a:r>
+            <a:br/>
+            <a:r>
+              <a:rPr sz="2400">
+                <a:solidFill>
+                  <a:srgbClr val="FFFFFF"/>
+                </a:solidFill>
+                <a:latin typeface="Times New Roman"/>
+              </a:rPr>
+              <a:t>关信息，否则不予评分。）</a:t>
             </a:r>
           </a:p>
         </p:txBody>

</xml_diff>